<commit_message>
Advanced RxSwift Day3 - ActivityIndicator
</commit_message>
<xml_diff>
--- a/AdvancedRxSwift/day1/AdvancedRxSwift1.pptx
+++ b/AdvancedRxSwift/day1/AdvancedRxSwift1.pptx
@@ -5,21 +5,23 @@
     <p:sldMasterId id="2147483657" r:id="rId1"/>
   </p:sldMasterIdLst>
   <p:notesMasterIdLst>
-    <p:notesMasterId r:id="rId14"/>
+    <p:notesMasterId r:id="rId16"/>
   </p:notesMasterIdLst>
   <p:sldIdLst>
     <p:sldId id="256" r:id="rId2"/>
-    <p:sldId id="333" r:id="rId3"/>
-    <p:sldId id="341" r:id="rId4"/>
-    <p:sldId id="342" r:id="rId5"/>
-    <p:sldId id="343" r:id="rId6"/>
-    <p:sldId id="339" r:id="rId7"/>
-    <p:sldId id="334" r:id="rId8"/>
-    <p:sldId id="335" r:id="rId9"/>
-    <p:sldId id="336" r:id="rId10"/>
-    <p:sldId id="337" r:id="rId11"/>
-    <p:sldId id="338" r:id="rId12"/>
-    <p:sldId id="340" r:id="rId13"/>
+    <p:sldId id="344" r:id="rId3"/>
+    <p:sldId id="345" r:id="rId4"/>
+    <p:sldId id="333" r:id="rId5"/>
+    <p:sldId id="341" r:id="rId6"/>
+    <p:sldId id="342" r:id="rId7"/>
+    <p:sldId id="343" r:id="rId8"/>
+    <p:sldId id="339" r:id="rId9"/>
+    <p:sldId id="334" r:id="rId10"/>
+    <p:sldId id="335" r:id="rId11"/>
+    <p:sldId id="336" r:id="rId12"/>
+    <p:sldId id="337" r:id="rId13"/>
+    <p:sldId id="338" r:id="rId14"/>
+    <p:sldId id="340" r:id="rId15"/>
   </p:sldIdLst>
   <p:sldSz cx="9144000" cy="5143500" type="screen16x9"/>
   <p:notesSz cx="6858000" cy="9144000"/>
@@ -812,6 +814,208 @@
 </file>
 
 <file path=ppt/notesSlides/notesSlide12.xml><?xml version="1.0" encoding="utf-8"?>
+<p:notes xmlns:a="http://schemas.openxmlformats.org/drawingml/2006/main" xmlns:r="http://schemas.openxmlformats.org/officeDocument/2006/relationships" xmlns:p="http://schemas.openxmlformats.org/presentationml/2006/main" showMasterSp="0" showMasterPhAnim="0">
+  <p:cSld>
+    <p:spTree>
+      <p:nvGrpSpPr>
+        <p:cNvPr id="1" name="Shape 185"/>
+        <p:cNvGrpSpPr/>
+        <p:nvPr/>
+      </p:nvGrpSpPr>
+      <p:grpSpPr>
+        <a:xfrm>
+          <a:off x="0" y="0"/>
+          <a:ext cx="0" cy="0"/>
+          <a:chOff x="0" y="0"/>
+          <a:chExt cx="0" cy="0"/>
+        </a:xfrm>
+      </p:grpSpPr>
+      <p:sp>
+        <p:nvSpPr>
+          <p:cNvPr id="186" name="Shape 186"/>
+          <p:cNvSpPr>
+            <a:spLocks noGrp="1" noRot="1" noChangeAspect="1"/>
+          </p:cNvSpPr>
+          <p:nvPr>
+            <p:ph type="sldImg" idx="2"/>
+          </p:nvPr>
+        </p:nvSpPr>
+        <p:spPr>
+          <a:xfrm>
+            <a:off x="381000" y="685800"/>
+            <a:ext cx="6096000" cy="3429000"/>
+          </a:xfrm>
+          <a:custGeom>
+            <a:avLst/>
+            <a:gdLst/>
+            <a:ahLst/>
+            <a:cxnLst/>
+            <a:rect l="0" t="0" r="0" b="0"/>
+            <a:pathLst>
+              <a:path w="120000" h="120000" extrusionOk="0">
+                <a:moveTo>
+                  <a:pt x="0" y="0"/>
+                </a:moveTo>
+                <a:lnTo>
+                  <a:pt x="120000" y="0"/>
+                </a:lnTo>
+                <a:lnTo>
+                  <a:pt x="120000" y="120000"/>
+                </a:lnTo>
+                <a:lnTo>
+                  <a:pt x="0" y="120000"/>
+                </a:lnTo>
+                <a:close/>
+              </a:path>
+            </a:pathLst>
+          </a:custGeom>
+        </p:spPr>
+      </p:sp>
+      <p:sp>
+        <p:nvSpPr>
+          <p:cNvPr id="187" name="Shape 187"/>
+          <p:cNvSpPr txBox="1">
+            <a:spLocks noGrp="1"/>
+          </p:cNvSpPr>
+          <p:nvPr>
+            <p:ph type="body" idx="1"/>
+          </p:nvPr>
+        </p:nvSpPr>
+        <p:spPr>
+          <a:xfrm>
+            <a:off x="685800" y="4343400"/>
+            <a:ext cx="5486400" cy="4114800"/>
+          </a:xfrm>
+          <a:prstGeom prst="rect">
+            <a:avLst/>
+          </a:prstGeom>
+        </p:spPr>
+        <p:txBody>
+          <a:bodyPr wrap="square" lIns="91425" tIns="91425" rIns="91425" bIns="91425" anchor="t" anchorCtr="0">
+            <a:noAutofit/>
+          </a:bodyPr>
+          <a:lstStyle/>
+          <a:p>
+            <a:pPr lvl="0">
+              <a:spcBef>
+                <a:spcPts val="0"/>
+              </a:spcBef>
+              <a:buNone/>
+            </a:pPr>
+            <a:endParaRPr/>
+          </a:p>
+        </p:txBody>
+      </p:sp>
+    </p:spTree>
+  </p:cSld>
+  <p:clrMapOvr>
+    <a:masterClrMapping/>
+  </p:clrMapOvr>
+</p:notes>
+</file>
+
+<file path=ppt/notesSlides/notesSlide13.xml><?xml version="1.0" encoding="utf-8"?>
+<p:notes xmlns:a="http://schemas.openxmlformats.org/drawingml/2006/main" xmlns:r="http://schemas.openxmlformats.org/officeDocument/2006/relationships" xmlns:p="http://schemas.openxmlformats.org/presentationml/2006/main" showMasterSp="0" showMasterPhAnim="0">
+  <p:cSld>
+    <p:spTree>
+      <p:nvGrpSpPr>
+        <p:cNvPr id="1" name="Shape 185"/>
+        <p:cNvGrpSpPr/>
+        <p:nvPr/>
+      </p:nvGrpSpPr>
+      <p:grpSpPr>
+        <a:xfrm>
+          <a:off x="0" y="0"/>
+          <a:ext cx="0" cy="0"/>
+          <a:chOff x="0" y="0"/>
+          <a:chExt cx="0" cy="0"/>
+        </a:xfrm>
+      </p:grpSpPr>
+      <p:sp>
+        <p:nvSpPr>
+          <p:cNvPr id="186" name="Shape 186"/>
+          <p:cNvSpPr>
+            <a:spLocks noGrp="1" noRot="1" noChangeAspect="1"/>
+          </p:cNvSpPr>
+          <p:nvPr>
+            <p:ph type="sldImg" idx="2"/>
+          </p:nvPr>
+        </p:nvSpPr>
+        <p:spPr>
+          <a:xfrm>
+            <a:off x="381000" y="685800"/>
+            <a:ext cx="6096000" cy="3429000"/>
+          </a:xfrm>
+          <a:custGeom>
+            <a:avLst/>
+            <a:gdLst/>
+            <a:ahLst/>
+            <a:cxnLst/>
+            <a:rect l="0" t="0" r="0" b="0"/>
+            <a:pathLst>
+              <a:path w="120000" h="120000" extrusionOk="0">
+                <a:moveTo>
+                  <a:pt x="0" y="0"/>
+                </a:moveTo>
+                <a:lnTo>
+                  <a:pt x="120000" y="0"/>
+                </a:lnTo>
+                <a:lnTo>
+                  <a:pt x="120000" y="120000"/>
+                </a:lnTo>
+                <a:lnTo>
+                  <a:pt x="0" y="120000"/>
+                </a:lnTo>
+                <a:close/>
+              </a:path>
+            </a:pathLst>
+          </a:custGeom>
+        </p:spPr>
+      </p:sp>
+      <p:sp>
+        <p:nvSpPr>
+          <p:cNvPr id="187" name="Shape 187"/>
+          <p:cNvSpPr txBox="1">
+            <a:spLocks noGrp="1"/>
+          </p:cNvSpPr>
+          <p:nvPr>
+            <p:ph type="body" idx="1"/>
+          </p:nvPr>
+        </p:nvSpPr>
+        <p:spPr>
+          <a:xfrm>
+            <a:off x="685800" y="4343400"/>
+            <a:ext cx="5486400" cy="4114800"/>
+          </a:xfrm>
+          <a:prstGeom prst="rect">
+            <a:avLst/>
+          </a:prstGeom>
+        </p:spPr>
+        <p:txBody>
+          <a:bodyPr wrap="square" lIns="91425" tIns="91425" rIns="91425" bIns="91425" anchor="t" anchorCtr="0">
+            <a:noAutofit/>
+          </a:bodyPr>
+          <a:lstStyle/>
+          <a:p>
+            <a:pPr lvl="0">
+              <a:spcBef>
+                <a:spcPts val="0"/>
+              </a:spcBef>
+              <a:buNone/>
+            </a:pPr>
+            <a:endParaRPr/>
+          </a:p>
+        </p:txBody>
+      </p:sp>
+    </p:spTree>
+  </p:cSld>
+  <p:clrMapOvr>
+    <a:masterClrMapping/>
+  </p:clrMapOvr>
+</p:notes>
+</file>
+
+<file path=ppt/notesSlides/notesSlide14.xml><?xml version="1.0" encoding="utf-8"?>
 <p:notes xmlns:a="http://schemas.openxmlformats.org/drawingml/2006/main" xmlns:r="http://schemas.openxmlformats.org/officeDocument/2006/relationships" xmlns:p="http://schemas.openxmlformats.org/presentationml/2006/main" showMasterSp="0" showMasterPhAnim="0">
   <p:cSld>
     <p:spTree>
@@ -4133,11 +4337,7 @@
             </a:r>
             <a:r>
               <a:rPr lang="en-US" sz="4400" dirty="0" smtClean="0"/>
-              <a:t> Day </a:t>
-            </a:r>
-            <a:r>
-              <a:rPr lang="en-US" sz="4400" dirty="0" smtClean="0"/>
-              <a:t>1</a:t>
+              <a:t> Day 1</a:t>
             </a:r>
             <a:endParaRPr lang="en" sz="4400" dirty="0"/>
           </a:p>
@@ -4531,7 +4731,7 @@
       </p:pic>
       <p:pic>
         <p:nvPicPr>
-          <p:cNvPr id="7" name="Picture 6" descr="Screen Shot 2018-05-06 at 6.06.38 PM.png"/>
+          <p:cNvPr id="7" name="Picture 6" descr="Screen Shot 2018-05-06 at 5.56.52 PM.png"/>
           <p:cNvPicPr>
             <a:picLocks noChangeAspect="1"/>
           </p:cNvPicPr>
@@ -4551,8 +4751,8 @@
         </p:blipFill>
         <p:spPr>
           <a:xfrm>
-            <a:off x="4020316" y="1429473"/>
-            <a:ext cx="5127054" cy="3036865"/>
+            <a:off x="0" y="1493789"/>
+            <a:ext cx="9144000" cy="963416"/>
           </a:xfrm>
           <a:prstGeom prst="rect">
             <a:avLst/>
@@ -4561,7 +4761,7 @@
       </p:pic>
       <p:pic>
         <p:nvPicPr>
-          <p:cNvPr id="8" name="Picture 7" descr="Screen Shot 2018-05-06 at 6.07.55 PM.png"/>
+          <p:cNvPr id="8" name="Picture 7" descr="Screen Shot 2018-05-06 at 5.59.50 PM.png"/>
           <p:cNvPicPr>
             <a:picLocks noChangeAspect="1"/>
           </p:cNvPicPr>
@@ -4581,8 +4781,8 @@
         </p:blipFill>
         <p:spPr>
           <a:xfrm>
-            <a:off x="12274" y="1608972"/>
-            <a:ext cx="3972293" cy="2348153"/>
+            <a:off x="0" y="2506285"/>
+            <a:ext cx="7137400" cy="2184400"/>
           </a:xfrm>
           <a:prstGeom prst="rect">
             <a:avLst/>
@@ -4592,7 +4792,7 @@
     </p:spTree>
     <p:extLst>
       <p:ext uri="{BB962C8B-B14F-4D97-AF65-F5344CB8AC3E}">
-        <p14:creationId xmlns:p14="http://schemas.microsoft.com/office/powerpoint/2010/main" val="1638730713"/>
+        <p14:creationId xmlns:p14="http://schemas.microsoft.com/office/powerpoint/2010/main" val="1851042509"/>
       </p:ext>
     </p:extLst>
   </p:cSld>
@@ -4744,7 +4944,7 @@
       </p:pic>
       <p:pic>
         <p:nvPicPr>
-          <p:cNvPr id="3" name="Picture 2" descr="Screen Shot 2018-05-06 at 6.10.38 PM.png"/>
+          <p:cNvPr id="3" name="Picture 2" descr="Screen Shot 2018-05-06 at 6.04.06 PM.png"/>
           <p:cNvPicPr>
             <a:picLocks noChangeAspect="1"/>
           </p:cNvPicPr>
@@ -4764,8 +4964,8 @@
         </p:blipFill>
         <p:spPr>
           <a:xfrm>
-            <a:off x="151129" y="1474961"/>
-            <a:ext cx="5181600" cy="2387600"/>
+            <a:off x="270500" y="1622183"/>
+            <a:ext cx="4953000" cy="1663700"/>
           </a:xfrm>
           <a:prstGeom prst="rect">
             <a:avLst/>
@@ -4774,7 +4974,7 @@
       </p:pic>
       <p:pic>
         <p:nvPicPr>
-          <p:cNvPr id="4" name="Picture 3" descr="Screen Shot 2018-05-06 at 6.10.51 PM.png"/>
+          <p:cNvPr id="4" name="Picture 3" descr="Screen Shot 2018-05-06 at 6.04.50 PM.png"/>
           <p:cNvPicPr>
             <a:picLocks noChangeAspect="1"/>
           </p:cNvPicPr>
@@ -4794,8 +4994,8 @@
         </p:blipFill>
         <p:spPr>
           <a:xfrm>
-            <a:off x="151129" y="4339124"/>
-            <a:ext cx="3136900" cy="533400"/>
+            <a:off x="270500" y="3588711"/>
+            <a:ext cx="2451100" cy="381000"/>
           </a:xfrm>
           <a:prstGeom prst="rect">
             <a:avLst/>
@@ -4805,7 +5005,7 @@
     </p:spTree>
     <p:extLst>
       <p:ext uri="{BB962C8B-B14F-4D97-AF65-F5344CB8AC3E}">
-        <p14:creationId xmlns:p14="http://schemas.microsoft.com/office/powerpoint/2010/main" val="4046537579"/>
+        <p14:creationId xmlns:p14="http://schemas.microsoft.com/office/powerpoint/2010/main" val="2555477460"/>
       </p:ext>
     </p:extLst>
   </p:cSld>
@@ -4851,8 +5051,8 @@
         </p:nvSpPr>
         <p:spPr>
           <a:xfrm>
-            <a:off x="884435" y="392575"/>
-            <a:ext cx="4139872" cy="766200"/>
+            <a:off x="740655" y="392575"/>
+            <a:ext cx="6229128" cy="766200"/>
           </a:xfrm>
           <a:prstGeom prst="rect">
             <a:avLst/>
@@ -4871,12 +5071,8 @@
               <a:buNone/>
             </a:pPr>
             <a:r>
-              <a:rPr lang="en-US" dirty="0" err="1" smtClean="0"/>
-              <a:t>RxSwift</a:t>
-            </a:r>
-            <a:r>
               <a:rPr lang="en-US" dirty="0" smtClean="0"/>
-              <a:t> </a:t>
+              <a:t>Grouping </a:t>
             </a:r>
             <a:r>
               <a:rPr lang="mr-IN" dirty="0" smtClean="0"/>
@@ -4884,11 +5080,7 @@
             </a:r>
             <a:r>
               <a:rPr lang="en-US" dirty="0" smtClean="0"/>
-              <a:t> </a:t>
-            </a:r>
-            <a:r>
-              <a:rPr lang="en-US" dirty="0" err="1" smtClean="0"/>
-              <a:t>Reactive.swift</a:t>
+              <a:t> Protocol Extension, associatetype</a:t>
             </a:r>
             <a:endParaRPr lang="en" dirty="0"/>
           </a:p>
@@ -4928,6 +5120,440 @@
             <a:fld id="{00000000-1234-1234-1234-123412341234}" type="slidenum">
               <a:rPr lang="en"/>
               <a:t>12</a:t>
+            </a:fld>
+            <a:endParaRPr lang="en"/>
+          </a:p>
+        </p:txBody>
+      </p:sp>
+      <p:pic>
+        <p:nvPicPr>
+          <p:cNvPr id="2" name="Picture 1" descr="Rx_Logo_M.png"/>
+          <p:cNvPicPr>
+            <a:picLocks noChangeAspect="1"/>
+          </p:cNvPicPr>
+          <p:nvPr/>
+        </p:nvPicPr>
+        <p:blipFill>
+          <a:blip r:embed="rId3">
+            <a:extLst>
+              <a:ext uri="{28A0092B-C50C-407E-A947-70E740481C1C}">
+                <a14:useLocalDpi xmlns:a14="http://schemas.microsoft.com/office/drawing/2010/main" val="0"/>
+              </a:ext>
+            </a:extLst>
+          </a:blip>
+          <a:stretch>
+            <a:fillRect/>
+          </a:stretch>
+        </p:blipFill>
+        <p:spPr>
+          <a:xfrm>
+            <a:off x="151129" y="442005"/>
+            <a:ext cx="663146" cy="663146"/>
+          </a:xfrm>
+          <a:prstGeom prst="rect">
+            <a:avLst/>
+          </a:prstGeom>
+        </p:spPr>
+      </p:pic>
+      <p:pic>
+        <p:nvPicPr>
+          <p:cNvPr id="7" name="Picture 6" descr="Screen Shot 2018-05-06 at 6.06.38 PM.png"/>
+          <p:cNvPicPr>
+            <a:picLocks noChangeAspect="1"/>
+          </p:cNvPicPr>
+          <p:nvPr/>
+        </p:nvPicPr>
+        <p:blipFill>
+          <a:blip r:embed="rId4">
+            <a:extLst>
+              <a:ext uri="{28A0092B-C50C-407E-A947-70E740481C1C}">
+                <a14:useLocalDpi xmlns:a14="http://schemas.microsoft.com/office/drawing/2010/main" val="0"/>
+              </a:ext>
+            </a:extLst>
+          </a:blip>
+          <a:stretch>
+            <a:fillRect/>
+          </a:stretch>
+        </p:blipFill>
+        <p:spPr>
+          <a:xfrm>
+            <a:off x="4020316" y="1429473"/>
+            <a:ext cx="5127054" cy="3036865"/>
+          </a:xfrm>
+          <a:prstGeom prst="rect">
+            <a:avLst/>
+          </a:prstGeom>
+        </p:spPr>
+      </p:pic>
+      <p:pic>
+        <p:nvPicPr>
+          <p:cNvPr id="8" name="Picture 7" descr="Screen Shot 2018-05-06 at 6.07.55 PM.png"/>
+          <p:cNvPicPr>
+            <a:picLocks noChangeAspect="1"/>
+          </p:cNvPicPr>
+          <p:nvPr/>
+        </p:nvPicPr>
+        <p:blipFill>
+          <a:blip r:embed="rId5">
+            <a:extLst>
+              <a:ext uri="{28A0092B-C50C-407E-A947-70E740481C1C}">
+                <a14:useLocalDpi xmlns:a14="http://schemas.microsoft.com/office/drawing/2010/main" val="0"/>
+              </a:ext>
+            </a:extLst>
+          </a:blip>
+          <a:stretch>
+            <a:fillRect/>
+          </a:stretch>
+        </p:blipFill>
+        <p:spPr>
+          <a:xfrm>
+            <a:off x="12274" y="1608972"/>
+            <a:ext cx="3972293" cy="2348153"/>
+          </a:xfrm>
+          <a:prstGeom prst="rect">
+            <a:avLst/>
+          </a:prstGeom>
+        </p:spPr>
+      </p:pic>
+    </p:spTree>
+    <p:extLst>
+      <p:ext uri="{BB962C8B-B14F-4D97-AF65-F5344CB8AC3E}">
+        <p14:creationId xmlns:p14="http://schemas.microsoft.com/office/powerpoint/2010/main" val="1638730713"/>
+      </p:ext>
+    </p:extLst>
+  </p:cSld>
+  <p:clrMapOvr>
+    <a:masterClrMapping/>
+  </p:clrMapOvr>
+  <p:timing>
+    <p:tnLst>
+      <p:par>
+        <p:cTn xmlns:p14="http://schemas.microsoft.com/office/powerpoint/2010/main" id="1" dur="indefinite" restart="never" nodeType="tmRoot"/>
+      </p:par>
+    </p:tnLst>
+  </p:timing>
+</p:sld>
+</file>
+
+<file path=ppt/slides/slide13.xml><?xml version="1.0" encoding="utf-8"?>
+<p:sld xmlns:a="http://schemas.openxmlformats.org/drawingml/2006/main" xmlns:r="http://schemas.openxmlformats.org/officeDocument/2006/relationships" xmlns:p="http://schemas.openxmlformats.org/presentationml/2006/main">
+  <p:cSld>
+    <p:spTree>
+      <p:nvGrpSpPr>
+        <p:cNvPr id="1" name="Shape 188"/>
+        <p:cNvGrpSpPr/>
+        <p:nvPr/>
+      </p:nvGrpSpPr>
+      <p:grpSpPr>
+        <a:xfrm>
+          <a:off x="0" y="0"/>
+          <a:ext cx="0" cy="0"/>
+          <a:chOff x="0" y="0"/>
+          <a:chExt cx="0" cy="0"/>
+        </a:xfrm>
+      </p:grpSpPr>
+      <p:sp>
+        <p:nvSpPr>
+          <p:cNvPr id="189" name="Shape 189"/>
+          <p:cNvSpPr txBox="1">
+            <a:spLocks noGrp="1"/>
+          </p:cNvSpPr>
+          <p:nvPr>
+            <p:ph type="title"/>
+          </p:nvPr>
+        </p:nvSpPr>
+        <p:spPr>
+          <a:xfrm>
+            <a:off x="740655" y="392575"/>
+            <a:ext cx="6229128" cy="766200"/>
+          </a:xfrm>
+          <a:prstGeom prst="rect">
+            <a:avLst/>
+          </a:prstGeom>
+        </p:spPr>
+        <p:txBody>
+          <a:bodyPr wrap="square" lIns="91425" tIns="91425" rIns="91425" bIns="91425" anchor="ctr" anchorCtr="0">
+            <a:noAutofit/>
+          </a:bodyPr>
+          <a:lstStyle/>
+          <a:p>
+            <a:pPr lvl="0" rtl="0">
+              <a:spcBef>
+                <a:spcPts val="0"/>
+              </a:spcBef>
+              <a:buNone/>
+            </a:pPr>
+            <a:r>
+              <a:rPr lang="en-US" dirty="0" smtClean="0"/>
+              <a:t>Grouping </a:t>
+            </a:r>
+            <a:r>
+              <a:rPr lang="mr-IN" dirty="0" smtClean="0"/>
+              <a:t>–</a:t>
+            </a:r>
+            <a:r>
+              <a:rPr lang="en-US" dirty="0" smtClean="0"/>
+              <a:t> Protocol Extension, associatetype</a:t>
+            </a:r>
+            <a:endParaRPr lang="en" dirty="0"/>
+          </a:p>
+        </p:txBody>
+      </p:sp>
+      <p:sp>
+        <p:nvSpPr>
+          <p:cNvPr id="192" name="Shape 192"/>
+          <p:cNvSpPr txBox="1">
+            <a:spLocks noGrp="1"/>
+          </p:cNvSpPr>
+          <p:nvPr>
+            <p:ph type="sldNum" idx="12"/>
+          </p:nvPr>
+        </p:nvSpPr>
+        <p:spPr>
+          <a:xfrm>
+            <a:off x="7618000" y="4636500"/>
+            <a:ext cx="1487400" cy="315600"/>
+          </a:xfrm>
+          <a:prstGeom prst="rect">
+            <a:avLst/>
+          </a:prstGeom>
+        </p:spPr>
+        <p:txBody>
+          <a:bodyPr wrap="square" lIns="91425" tIns="91425" rIns="91425" bIns="91425" anchor="ctr" anchorCtr="0">
+            <a:noAutofit/>
+          </a:bodyPr>
+          <a:lstStyle/>
+          <a:p>
+            <a:pPr lvl="0">
+              <a:spcBef>
+                <a:spcPts val="0"/>
+              </a:spcBef>
+              <a:buNone/>
+            </a:pPr>
+            <a:fld id="{00000000-1234-1234-1234-123412341234}" type="slidenum">
+              <a:rPr lang="en"/>
+              <a:t>13</a:t>
+            </a:fld>
+            <a:endParaRPr lang="en"/>
+          </a:p>
+        </p:txBody>
+      </p:sp>
+      <p:pic>
+        <p:nvPicPr>
+          <p:cNvPr id="2" name="Picture 1" descr="Rx_Logo_M.png"/>
+          <p:cNvPicPr>
+            <a:picLocks noChangeAspect="1"/>
+          </p:cNvPicPr>
+          <p:nvPr/>
+        </p:nvPicPr>
+        <p:blipFill>
+          <a:blip r:embed="rId3">
+            <a:extLst>
+              <a:ext uri="{28A0092B-C50C-407E-A947-70E740481C1C}">
+                <a14:useLocalDpi xmlns:a14="http://schemas.microsoft.com/office/drawing/2010/main" val="0"/>
+              </a:ext>
+            </a:extLst>
+          </a:blip>
+          <a:stretch>
+            <a:fillRect/>
+          </a:stretch>
+        </p:blipFill>
+        <p:spPr>
+          <a:xfrm>
+            <a:off x="151129" y="442005"/>
+            <a:ext cx="663146" cy="663146"/>
+          </a:xfrm>
+          <a:prstGeom prst="rect">
+            <a:avLst/>
+          </a:prstGeom>
+        </p:spPr>
+      </p:pic>
+      <p:pic>
+        <p:nvPicPr>
+          <p:cNvPr id="3" name="Picture 2" descr="Screen Shot 2018-05-06 at 6.10.38 PM.png"/>
+          <p:cNvPicPr>
+            <a:picLocks noChangeAspect="1"/>
+          </p:cNvPicPr>
+          <p:nvPr/>
+        </p:nvPicPr>
+        <p:blipFill>
+          <a:blip r:embed="rId4">
+            <a:extLst>
+              <a:ext uri="{28A0092B-C50C-407E-A947-70E740481C1C}">
+                <a14:useLocalDpi xmlns:a14="http://schemas.microsoft.com/office/drawing/2010/main" val="0"/>
+              </a:ext>
+            </a:extLst>
+          </a:blip>
+          <a:stretch>
+            <a:fillRect/>
+          </a:stretch>
+        </p:blipFill>
+        <p:spPr>
+          <a:xfrm>
+            <a:off x="151129" y="1474961"/>
+            <a:ext cx="5181600" cy="2387600"/>
+          </a:xfrm>
+          <a:prstGeom prst="rect">
+            <a:avLst/>
+          </a:prstGeom>
+        </p:spPr>
+      </p:pic>
+      <p:pic>
+        <p:nvPicPr>
+          <p:cNvPr id="4" name="Picture 3" descr="Screen Shot 2018-05-06 at 6.10.51 PM.png"/>
+          <p:cNvPicPr>
+            <a:picLocks noChangeAspect="1"/>
+          </p:cNvPicPr>
+          <p:nvPr/>
+        </p:nvPicPr>
+        <p:blipFill>
+          <a:blip r:embed="rId5">
+            <a:extLst>
+              <a:ext uri="{28A0092B-C50C-407E-A947-70E740481C1C}">
+                <a14:useLocalDpi xmlns:a14="http://schemas.microsoft.com/office/drawing/2010/main" val="0"/>
+              </a:ext>
+            </a:extLst>
+          </a:blip>
+          <a:stretch>
+            <a:fillRect/>
+          </a:stretch>
+        </p:blipFill>
+        <p:spPr>
+          <a:xfrm>
+            <a:off x="151129" y="4339124"/>
+            <a:ext cx="3136900" cy="533400"/>
+          </a:xfrm>
+          <a:prstGeom prst="rect">
+            <a:avLst/>
+          </a:prstGeom>
+        </p:spPr>
+      </p:pic>
+    </p:spTree>
+    <p:extLst>
+      <p:ext uri="{BB962C8B-B14F-4D97-AF65-F5344CB8AC3E}">
+        <p14:creationId xmlns:p14="http://schemas.microsoft.com/office/powerpoint/2010/main" val="4046537579"/>
+      </p:ext>
+    </p:extLst>
+  </p:cSld>
+  <p:clrMapOvr>
+    <a:masterClrMapping/>
+  </p:clrMapOvr>
+  <p:timing>
+    <p:tnLst>
+      <p:par>
+        <p:cTn xmlns:p14="http://schemas.microsoft.com/office/powerpoint/2010/main" id="1" dur="indefinite" restart="never" nodeType="tmRoot"/>
+      </p:par>
+    </p:tnLst>
+  </p:timing>
+</p:sld>
+</file>
+
+<file path=ppt/slides/slide14.xml><?xml version="1.0" encoding="utf-8"?>
+<p:sld xmlns:a="http://schemas.openxmlformats.org/drawingml/2006/main" xmlns:r="http://schemas.openxmlformats.org/officeDocument/2006/relationships" xmlns:p="http://schemas.openxmlformats.org/presentationml/2006/main">
+  <p:cSld>
+    <p:spTree>
+      <p:nvGrpSpPr>
+        <p:cNvPr id="1" name="Shape 188"/>
+        <p:cNvGrpSpPr/>
+        <p:nvPr/>
+      </p:nvGrpSpPr>
+      <p:grpSpPr>
+        <a:xfrm>
+          <a:off x="0" y="0"/>
+          <a:ext cx="0" cy="0"/>
+          <a:chOff x="0" y="0"/>
+          <a:chExt cx="0" cy="0"/>
+        </a:xfrm>
+      </p:grpSpPr>
+      <p:sp>
+        <p:nvSpPr>
+          <p:cNvPr id="189" name="Shape 189"/>
+          <p:cNvSpPr txBox="1">
+            <a:spLocks noGrp="1"/>
+          </p:cNvSpPr>
+          <p:nvPr>
+            <p:ph type="title"/>
+          </p:nvPr>
+        </p:nvSpPr>
+        <p:spPr>
+          <a:xfrm>
+            <a:off x="884435" y="392575"/>
+            <a:ext cx="4139872" cy="766200"/>
+          </a:xfrm>
+          <a:prstGeom prst="rect">
+            <a:avLst/>
+          </a:prstGeom>
+        </p:spPr>
+        <p:txBody>
+          <a:bodyPr wrap="square" lIns="91425" tIns="91425" rIns="91425" bIns="91425" anchor="ctr" anchorCtr="0">
+            <a:noAutofit/>
+          </a:bodyPr>
+          <a:lstStyle/>
+          <a:p>
+            <a:pPr lvl="0" rtl="0">
+              <a:spcBef>
+                <a:spcPts val="0"/>
+              </a:spcBef>
+              <a:buNone/>
+            </a:pPr>
+            <a:r>
+              <a:rPr lang="en-US" dirty="0" err="1" smtClean="0"/>
+              <a:t>RxSwift</a:t>
+            </a:r>
+            <a:r>
+              <a:rPr lang="en-US" dirty="0" smtClean="0"/>
+              <a:t> </a:t>
+            </a:r>
+            <a:r>
+              <a:rPr lang="mr-IN" dirty="0" smtClean="0"/>
+              <a:t>–</a:t>
+            </a:r>
+            <a:r>
+              <a:rPr lang="en-US" dirty="0" smtClean="0"/>
+              <a:t> </a:t>
+            </a:r>
+            <a:r>
+              <a:rPr lang="en-US" dirty="0" err="1" smtClean="0"/>
+              <a:t>Reactive.swift</a:t>
+            </a:r>
+            <a:endParaRPr lang="en" dirty="0"/>
+          </a:p>
+        </p:txBody>
+      </p:sp>
+      <p:sp>
+        <p:nvSpPr>
+          <p:cNvPr id="192" name="Shape 192"/>
+          <p:cNvSpPr txBox="1">
+            <a:spLocks noGrp="1"/>
+          </p:cNvSpPr>
+          <p:nvPr>
+            <p:ph type="sldNum" idx="12"/>
+          </p:nvPr>
+        </p:nvSpPr>
+        <p:spPr>
+          <a:xfrm>
+            <a:off x="7618000" y="4636500"/>
+            <a:ext cx="1487400" cy="315600"/>
+          </a:xfrm>
+          <a:prstGeom prst="rect">
+            <a:avLst/>
+          </a:prstGeom>
+        </p:spPr>
+        <p:txBody>
+          <a:bodyPr wrap="square" lIns="91425" tIns="91425" rIns="91425" bIns="91425" anchor="ctr" anchorCtr="0">
+            <a:noAutofit/>
+          </a:bodyPr>
+          <a:lstStyle/>
+          <a:p>
+            <a:pPr lvl="0">
+              <a:spcBef>
+                <a:spcPts val="0"/>
+              </a:spcBef>
+              <a:buNone/>
+            </a:pPr>
+            <a:fld id="{00000000-1234-1234-1234-123412341234}" type="slidenum">
+              <a:rPr lang="en"/>
+              <a:t>14</a:t>
             </a:fld>
             <a:endParaRPr lang="en"/>
           </a:p>
@@ -5085,8 +5711,8 @@
         </p:nvSpPr>
         <p:spPr>
           <a:xfrm>
-            <a:off x="740655" y="392575"/>
-            <a:ext cx="6229128" cy="766200"/>
+            <a:off x="814275" y="392575"/>
+            <a:ext cx="5258400" cy="766200"/>
           </a:xfrm>
           <a:prstGeom prst="rect">
             <a:avLst/>
@@ -5105,8 +5731,12 @@
               <a:buNone/>
             </a:pPr>
             <a:r>
+              <a:rPr lang="en-US" dirty="0" err="1" smtClean="0"/>
+              <a:t>RxSwift</a:t>
+            </a:r>
+            <a:r>
               <a:rPr lang="en-US" dirty="0" smtClean="0"/>
-              <a:t>Protocol-Oriented Programming in Swift</a:t>
+              <a:t> Basics</a:t>
             </a:r>
             <a:endParaRPr lang="en" dirty="0"/>
           </a:p>
@@ -5183,6 +5813,697 @@
       </p:pic>
       <p:sp>
         <p:nvSpPr>
+          <p:cNvPr id="9" name="Shape 237"/>
+          <p:cNvSpPr txBox="1">
+            <a:spLocks noGrp="1"/>
+          </p:cNvSpPr>
+          <p:nvPr>
+            <p:ph type="body" idx="1"/>
+          </p:nvPr>
+        </p:nvSpPr>
+        <p:spPr>
+          <a:xfrm>
+            <a:off x="554601" y="1650424"/>
+            <a:ext cx="8115791" cy="2862119"/>
+          </a:xfrm>
+          <a:prstGeom prst="rect">
+            <a:avLst/>
+          </a:prstGeom>
+        </p:spPr>
+        <p:txBody>
+          <a:bodyPr wrap="square" lIns="91425" tIns="91425" rIns="91425" bIns="91425" anchor="ctr" anchorCtr="0">
+            <a:noAutofit/>
+          </a:bodyPr>
+          <a:lstStyle/>
+          <a:p>
+            <a:r>
+              <a:rPr lang="en-US" dirty="0" smtClean="0"/>
+              <a:t>Day 1 </a:t>
+            </a:r>
+            <a:r>
+              <a:rPr lang="mr-IN" dirty="0" smtClean="0"/>
+              <a:t>–</a:t>
+            </a:r>
+            <a:r>
+              <a:rPr lang="en-US" dirty="0" smtClean="0"/>
+              <a:t> Observable, Operator (Filter, Transform, Combine</a:t>
+            </a:r>
+            <a:r>
+              <a:rPr lang="en-US" dirty="0" smtClean="0"/>
+              <a:t>)</a:t>
+            </a:r>
+            <a:endParaRPr lang="en-US" b="1" dirty="0" smtClean="0"/>
+          </a:p>
+          <a:p>
+            <a:r>
+              <a:rPr lang="en-US" dirty="0"/>
+              <a:t>Day </a:t>
+            </a:r>
+            <a:r>
+              <a:rPr lang="en-US" dirty="0" smtClean="0"/>
+              <a:t>2 </a:t>
+            </a:r>
+            <a:r>
+              <a:rPr lang="mr-IN" dirty="0"/>
+              <a:t>–</a:t>
+            </a:r>
+            <a:r>
+              <a:rPr lang="en-US" dirty="0"/>
+              <a:t> </a:t>
+            </a:r>
+            <a:r>
+              <a:rPr lang="en-US" dirty="0" smtClean="0"/>
+              <a:t>Subject (</a:t>
+            </a:r>
+            <a:r>
+              <a:rPr lang="en-US" dirty="0" err="1" smtClean="0"/>
+              <a:t>flatMap</a:t>
+            </a:r>
+            <a:r>
+              <a:rPr lang="en-US" dirty="0" smtClean="0"/>
+              <a:t>, </a:t>
+            </a:r>
+            <a:r>
+              <a:rPr lang="en-US" dirty="0" err="1" smtClean="0"/>
+              <a:t>flatMapFirst</a:t>
+            </a:r>
+            <a:r>
+              <a:rPr lang="en-US" dirty="0" smtClean="0"/>
+              <a:t>, </a:t>
+            </a:r>
+            <a:r>
+              <a:rPr lang="en-US" dirty="0" err="1" smtClean="0"/>
+              <a:t>flatMapLatest</a:t>
+            </a:r>
+            <a:r>
+              <a:rPr lang="en-US" dirty="0" smtClean="0"/>
+              <a:t>)</a:t>
+            </a:r>
+            <a:endParaRPr lang="en-US" dirty="0"/>
+          </a:p>
+          <a:p>
+            <a:r>
+              <a:rPr lang="en-US" dirty="0"/>
+              <a:t>Day </a:t>
+            </a:r>
+            <a:r>
+              <a:rPr lang="en-US" dirty="0" smtClean="0"/>
+              <a:t>3 </a:t>
+            </a:r>
+            <a:r>
+              <a:rPr lang="mr-IN" dirty="0"/>
+              <a:t>–</a:t>
+            </a:r>
+            <a:r>
+              <a:rPr lang="en-US" dirty="0"/>
+              <a:t> </a:t>
+            </a:r>
+            <a:r>
+              <a:rPr lang="en-US" dirty="0" smtClean="0"/>
+              <a:t>Two VCs communications with Subject, </a:t>
+            </a:r>
+            <a:r>
+              <a:rPr lang="en-US" dirty="0" err="1" smtClean="0"/>
+              <a:t>RxCocoa</a:t>
+            </a:r>
+            <a:r>
+              <a:rPr lang="en-US" dirty="0" smtClean="0"/>
+              <a:t> (Button)</a:t>
+            </a:r>
+            <a:endParaRPr lang="en-US" dirty="0"/>
+          </a:p>
+          <a:p>
+            <a:r>
+              <a:rPr lang="en-US" dirty="0"/>
+              <a:t>Day </a:t>
+            </a:r>
+            <a:r>
+              <a:rPr lang="en-US" dirty="0" smtClean="0"/>
+              <a:t>4 </a:t>
+            </a:r>
+            <a:r>
+              <a:rPr lang="mr-IN" dirty="0"/>
+              <a:t>–</a:t>
+            </a:r>
+            <a:r>
+              <a:rPr lang="en-US" dirty="0"/>
+              <a:t> </a:t>
+            </a:r>
+            <a:r>
+              <a:rPr lang="en-US" dirty="0" smtClean="0"/>
+              <a:t>Sequential, Merged Observable Calls</a:t>
+            </a:r>
+            <a:endParaRPr lang="en-US" dirty="0"/>
+          </a:p>
+          <a:p>
+            <a:r>
+              <a:rPr lang="en-US" dirty="0"/>
+              <a:t>Day </a:t>
+            </a:r>
+            <a:r>
+              <a:rPr lang="en-US" dirty="0" smtClean="0"/>
+              <a:t>5 </a:t>
+            </a:r>
+            <a:r>
+              <a:rPr lang="mr-IN" dirty="0"/>
+              <a:t>–</a:t>
+            </a:r>
+            <a:r>
+              <a:rPr lang="en-US" dirty="0"/>
+              <a:t> </a:t>
+            </a:r>
+            <a:r>
+              <a:rPr lang="en-US" dirty="0" err="1" smtClean="0"/>
+              <a:t>RxCocoa</a:t>
+            </a:r>
+            <a:r>
+              <a:rPr lang="en-US" dirty="0" smtClean="0"/>
+              <a:t>, UI Binding (Button, </a:t>
+            </a:r>
+            <a:r>
+              <a:rPr lang="en-US" dirty="0" err="1" smtClean="0"/>
+              <a:t>TextField</a:t>
+            </a:r>
+            <a:r>
+              <a:rPr lang="en-US" dirty="0" smtClean="0"/>
+              <a:t>, Label, </a:t>
+            </a:r>
+            <a:r>
+              <a:rPr lang="en-US" dirty="0" err="1" smtClean="0"/>
+              <a:t>TableView</a:t>
+            </a:r>
+            <a:r>
+              <a:rPr lang="en-US" dirty="0" smtClean="0"/>
+              <a:t>)</a:t>
+            </a:r>
+            <a:endParaRPr lang="en-US" dirty="0"/>
+          </a:p>
+          <a:p>
+            <a:endParaRPr lang="en-US" dirty="0" smtClean="0"/>
+          </a:p>
+        </p:txBody>
+      </p:sp>
+    </p:spTree>
+    <p:extLst>
+      <p:ext uri="{BB962C8B-B14F-4D97-AF65-F5344CB8AC3E}">
+        <p14:creationId xmlns:p14="http://schemas.microsoft.com/office/powerpoint/2010/main" val="1246616820"/>
+      </p:ext>
+    </p:extLst>
+  </p:cSld>
+  <p:clrMapOvr>
+    <a:masterClrMapping/>
+  </p:clrMapOvr>
+  <p:timing>
+    <p:tnLst>
+      <p:par>
+        <p:cTn xmlns:p14="http://schemas.microsoft.com/office/powerpoint/2010/main" id="1" dur="indefinite" restart="never" nodeType="tmRoot"/>
+      </p:par>
+    </p:tnLst>
+  </p:timing>
+</p:sld>
+</file>
+
+<file path=ppt/slides/slide3.xml><?xml version="1.0" encoding="utf-8"?>
+<p:sld xmlns:a="http://schemas.openxmlformats.org/drawingml/2006/main" xmlns:r="http://schemas.openxmlformats.org/officeDocument/2006/relationships" xmlns:p="http://schemas.openxmlformats.org/presentationml/2006/main">
+  <p:cSld>
+    <p:spTree>
+      <p:nvGrpSpPr>
+        <p:cNvPr id="1" name="Shape 188"/>
+        <p:cNvGrpSpPr/>
+        <p:nvPr/>
+      </p:nvGrpSpPr>
+      <p:grpSpPr>
+        <a:xfrm>
+          <a:off x="0" y="0"/>
+          <a:ext cx="0" cy="0"/>
+          <a:chOff x="0" y="0"/>
+          <a:chExt cx="0" cy="0"/>
+        </a:xfrm>
+      </p:grpSpPr>
+      <p:sp>
+        <p:nvSpPr>
+          <p:cNvPr id="189" name="Shape 189"/>
+          <p:cNvSpPr txBox="1">
+            <a:spLocks noGrp="1"/>
+          </p:cNvSpPr>
+          <p:nvPr>
+            <p:ph type="title"/>
+          </p:nvPr>
+        </p:nvSpPr>
+        <p:spPr>
+          <a:xfrm>
+            <a:off x="814275" y="392575"/>
+            <a:ext cx="5258400" cy="766200"/>
+          </a:xfrm>
+          <a:prstGeom prst="rect">
+            <a:avLst/>
+          </a:prstGeom>
+        </p:spPr>
+        <p:txBody>
+          <a:bodyPr wrap="square" lIns="91425" tIns="91425" rIns="91425" bIns="91425" anchor="ctr" anchorCtr="0">
+            <a:noAutofit/>
+          </a:bodyPr>
+          <a:lstStyle/>
+          <a:p>
+            <a:pPr lvl="0" rtl="0">
+              <a:spcBef>
+                <a:spcPts val="0"/>
+              </a:spcBef>
+              <a:buNone/>
+            </a:pPr>
+            <a:r>
+              <a:rPr lang="en-US" dirty="0" smtClean="0"/>
+              <a:t>Advanced </a:t>
+            </a:r>
+            <a:r>
+              <a:rPr lang="en-US" dirty="0" err="1" smtClean="0"/>
+              <a:t>RxSwift</a:t>
+            </a:r>
+            <a:endParaRPr lang="en" dirty="0"/>
+          </a:p>
+        </p:txBody>
+      </p:sp>
+      <p:sp>
+        <p:nvSpPr>
+          <p:cNvPr id="192" name="Shape 192"/>
+          <p:cNvSpPr txBox="1">
+            <a:spLocks noGrp="1"/>
+          </p:cNvSpPr>
+          <p:nvPr>
+            <p:ph type="sldNum" idx="12"/>
+          </p:nvPr>
+        </p:nvSpPr>
+        <p:spPr>
+          <a:xfrm>
+            <a:off x="7618000" y="4636500"/>
+            <a:ext cx="1487400" cy="315600"/>
+          </a:xfrm>
+          <a:prstGeom prst="rect">
+            <a:avLst/>
+          </a:prstGeom>
+        </p:spPr>
+        <p:txBody>
+          <a:bodyPr wrap="square" lIns="91425" tIns="91425" rIns="91425" bIns="91425" anchor="ctr" anchorCtr="0">
+            <a:noAutofit/>
+          </a:bodyPr>
+          <a:lstStyle/>
+          <a:p>
+            <a:pPr lvl="0">
+              <a:spcBef>
+                <a:spcPts val="0"/>
+              </a:spcBef>
+              <a:buNone/>
+            </a:pPr>
+            <a:fld id="{00000000-1234-1234-1234-123412341234}" type="slidenum">
+              <a:rPr lang="en"/>
+              <a:t>3</a:t>
+            </a:fld>
+            <a:endParaRPr lang="en"/>
+          </a:p>
+        </p:txBody>
+      </p:sp>
+      <p:pic>
+        <p:nvPicPr>
+          <p:cNvPr id="2" name="Picture 1" descr="Rx_Logo_M.png"/>
+          <p:cNvPicPr>
+            <a:picLocks noChangeAspect="1"/>
+          </p:cNvPicPr>
+          <p:nvPr/>
+        </p:nvPicPr>
+        <p:blipFill>
+          <a:blip r:embed="rId3">
+            <a:extLst>
+              <a:ext uri="{28A0092B-C50C-407E-A947-70E740481C1C}">
+                <a14:useLocalDpi xmlns:a14="http://schemas.microsoft.com/office/drawing/2010/main" val="0"/>
+              </a:ext>
+            </a:extLst>
+          </a:blip>
+          <a:stretch>
+            <a:fillRect/>
+          </a:stretch>
+        </p:blipFill>
+        <p:spPr>
+          <a:xfrm>
+            <a:off x="151129" y="442005"/>
+            <a:ext cx="663146" cy="663146"/>
+          </a:xfrm>
+          <a:prstGeom prst="rect">
+            <a:avLst/>
+          </a:prstGeom>
+        </p:spPr>
+      </p:pic>
+      <p:sp>
+        <p:nvSpPr>
+          <p:cNvPr id="9" name="Shape 237"/>
+          <p:cNvSpPr txBox="1">
+            <a:spLocks noGrp="1"/>
+          </p:cNvSpPr>
+          <p:nvPr>
+            <p:ph type="body" idx="1"/>
+          </p:nvPr>
+        </p:nvSpPr>
+        <p:spPr>
+          <a:xfrm>
+            <a:off x="151129" y="1447005"/>
+            <a:ext cx="8891026" cy="3353768"/>
+          </a:xfrm>
+          <a:prstGeom prst="rect">
+            <a:avLst/>
+          </a:prstGeom>
+        </p:spPr>
+        <p:txBody>
+          <a:bodyPr wrap="square" lIns="91425" tIns="91425" rIns="91425" bIns="91425" anchor="ctr" anchorCtr="0">
+            <a:noAutofit/>
+          </a:bodyPr>
+          <a:lstStyle/>
+          <a:p>
+            <a:r>
+              <a:rPr lang="en-US" b="1" dirty="0" smtClean="0"/>
+              <a:t>Day 1 </a:t>
+            </a:r>
+            <a:r>
+              <a:rPr lang="mr-IN" b="1" dirty="0" smtClean="0"/>
+              <a:t>–</a:t>
+            </a:r>
+            <a:r>
+              <a:rPr lang="en-US" b="1" dirty="0" smtClean="0"/>
+              <a:t> Protocol-Oriented Programming, Protocol Extension, </a:t>
+            </a:r>
+            <a:r>
+              <a:rPr lang="en-US" b="1" dirty="0" smtClean="0"/>
+              <a:t>		</a:t>
+            </a:r>
+            <a:r>
+              <a:rPr lang="en-US" b="1" dirty="0" err="1" smtClean="0"/>
+              <a:t>Associatetype</a:t>
+            </a:r>
+            <a:endParaRPr lang="en-US" b="1" dirty="0" smtClean="0"/>
+          </a:p>
+          <a:p>
+            <a:endParaRPr lang="en-US" b="1" dirty="0" smtClean="0"/>
+          </a:p>
+          <a:p>
+            <a:r>
+              <a:rPr lang="en-US" dirty="0"/>
+              <a:t>Day </a:t>
+            </a:r>
+            <a:r>
+              <a:rPr lang="en-US" dirty="0" smtClean="0"/>
+              <a:t>2 </a:t>
+            </a:r>
+            <a:r>
+              <a:rPr lang="mr-IN" dirty="0"/>
+              <a:t>–</a:t>
+            </a:r>
+            <a:r>
+              <a:rPr lang="en-US" dirty="0"/>
+              <a:t> </a:t>
+            </a:r>
+            <a:r>
+              <a:rPr lang="en-US" dirty="0" smtClean="0"/>
+              <a:t>Network Call, Generic </a:t>
+            </a:r>
+            <a:r>
+              <a:rPr lang="en-US" dirty="0" err="1" smtClean="0"/>
+              <a:t>Enum</a:t>
+            </a:r>
+            <a:endParaRPr lang="en-US" dirty="0"/>
+          </a:p>
+          <a:p>
+            <a:r>
+              <a:rPr lang="en-US" dirty="0"/>
+              <a:t>Day </a:t>
+            </a:r>
+            <a:r>
+              <a:rPr lang="en-US" dirty="0" smtClean="0"/>
+              <a:t>3 </a:t>
+            </a:r>
+            <a:r>
+              <a:rPr lang="mr-IN" dirty="0"/>
+              <a:t>–</a:t>
+            </a:r>
+            <a:r>
+              <a:rPr lang="en-US" dirty="0"/>
+              <a:t> </a:t>
+            </a:r>
+            <a:r>
+              <a:rPr lang="en-US" dirty="0" smtClean="0"/>
+              <a:t>Binding Track Activity (show / hide ‘Loading’ )</a:t>
+            </a:r>
+            <a:endParaRPr lang="en-US" dirty="0"/>
+          </a:p>
+          <a:p>
+            <a:r>
+              <a:rPr lang="en-US" dirty="0"/>
+              <a:t>Day </a:t>
+            </a:r>
+            <a:r>
+              <a:rPr lang="en-US" dirty="0" smtClean="0"/>
+              <a:t>4 </a:t>
+            </a:r>
+            <a:r>
+              <a:rPr lang="mr-IN" dirty="0"/>
+              <a:t>–</a:t>
+            </a:r>
+            <a:r>
+              <a:rPr lang="en-US" dirty="0"/>
+              <a:t> </a:t>
+            </a:r>
+            <a:r>
+              <a:rPr lang="en-US" dirty="0" smtClean="0"/>
+              <a:t>Advanced </a:t>
+            </a:r>
+            <a:r>
+              <a:rPr lang="en-US" dirty="0" err="1" smtClean="0"/>
+              <a:t>TableView</a:t>
+            </a:r>
+            <a:r>
+              <a:rPr lang="en-US" dirty="0" smtClean="0"/>
+              <a:t> - </a:t>
+            </a:r>
+            <a:r>
+              <a:rPr lang="en-US" dirty="0" err="1" smtClean="0"/>
+              <a:t>RxDataSources</a:t>
+            </a:r>
+            <a:endParaRPr lang="en-US" dirty="0"/>
+          </a:p>
+          <a:p>
+            <a:r>
+              <a:rPr lang="en-US" dirty="0"/>
+              <a:t>Day </a:t>
+            </a:r>
+            <a:r>
+              <a:rPr lang="en-US" dirty="0" smtClean="0"/>
+              <a:t>5 </a:t>
+            </a:r>
+            <a:r>
+              <a:rPr lang="mr-IN" dirty="0"/>
+              <a:t>–</a:t>
+            </a:r>
+            <a:r>
+              <a:rPr lang="en-US" dirty="0"/>
+              <a:t> </a:t>
+            </a:r>
+            <a:r>
+              <a:rPr lang="en-US" dirty="0" smtClean="0"/>
+              <a:t>Schedulers (</a:t>
+            </a:r>
+            <a:r>
+              <a:rPr lang="en-US" dirty="0" err="1" smtClean="0"/>
+              <a:t>observeOn</a:t>
+            </a:r>
+            <a:r>
+              <a:rPr lang="en-US" dirty="0" smtClean="0"/>
+              <a:t>, </a:t>
+            </a:r>
+            <a:r>
+              <a:rPr lang="en-US" dirty="0" err="1" smtClean="0"/>
+              <a:t>subscribeOn</a:t>
+            </a:r>
+            <a:r>
+              <a:rPr lang="en-US" dirty="0" smtClean="0"/>
+              <a:t>), </a:t>
+            </a:r>
+          </a:p>
+          <a:p>
+            <a:pPr lvl="1">
+              <a:buNone/>
+            </a:pPr>
+            <a:r>
+              <a:rPr lang="en-US" dirty="0"/>
+              <a:t>	</a:t>
+            </a:r>
+            <a:r>
+              <a:rPr lang="en-US" dirty="0" smtClean="0"/>
+              <a:t>	Unit Test (</a:t>
+            </a:r>
+            <a:r>
+              <a:rPr lang="en-US" dirty="0" err="1" smtClean="0"/>
+              <a:t>RxTest</a:t>
+            </a:r>
+            <a:r>
+              <a:rPr lang="en-US" dirty="0" smtClean="0"/>
+              <a:t>, </a:t>
+            </a:r>
+            <a:r>
+              <a:rPr lang="en-US" dirty="0" err="1" smtClean="0"/>
+              <a:t>RxBlocking</a:t>
+            </a:r>
+            <a:r>
+              <a:rPr lang="en-US" dirty="0" smtClean="0"/>
+              <a:t>)</a:t>
+            </a:r>
+            <a:endParaRPr lang="en-US" dirty="0"/>
+          </a:p>
+        </p:txBody>
+      </p:sp>
+    </p:spTree>
+    <p:extLst>
+      <p:ext uri="{BB962C8B-B14F-4D97-AF65-F5344CB8AC3E}">
+        <p14:creationId xmlns:p14="http://schemas.microsoft.com/office/powerpoint/2010/main" val="1475647545"/>
+      </p:ext>
+    </p:extLst>
+  </p:cSld>
+  <p:clrMapOvr>
+    <a:masterClrMapping/>
+  </p:clrMapOvr>
+  <p:timing>
+    <p:tnLst>
+      <p:par>
+        <p:cTn xmlns:p14="http://schemas.microsoft.com/office/powerpoint/2010/main" id="1" dur="indefinite" restart="never" nodeType="tmRoot"/>
+      </p:par>
+    </p:tnLst>
+  </p:timing>
+</p:sld>
+</file>
+
+<file path=ppt/slides/slide4.xml><?xml version="1.0" encoding="utf-8"?>
+<p:sld xmlns:a="http://schemas.openxmlformats.org/drawingml/2006/main" xmlns:r="http://schemas.openxmlformats.org/officeDocument/2006/relationships" xmlns:p="http://schemas.openxmlformats.org/presentationml/2006/main">
+  <p:cSld>
+    <p:spTree>
+      <p:nvGrpSpPr>
+        <p:cNvPr id="1" name="Shape 188"/>
+        <p:cNvGrpSpPr/>
+        <p:nvPr/>
+      </p:nvGrpSpPr>
+      <p:grpSpPr>
+        <a:xfrm>
+          <a:off x="0" y="0"/>
+          <a:ext cx="0" cy="0"/>
+          <a:chOff x="0" y="0"/>
+          <a:chExt cx="0" cy="0"/>
+        </a:xfrm>
+      </p:grpSpPr>
+      <p:sp>
+        <p:nvSpPr>
+          <p:cNvPr id="189" name="Shape 189"/>
+          <p:cNvSpPr txBox="1">
+            <a:spLocks noGrp="1"/>
+          </p:cNvSpPr>
+          <p:nvPr>
+            <p:ph type="title"/>
+          </p:nvPr>
+        </p:nvSpPr>
+        <p:spPr>
+          <a:xfrm>
+            <a:off x="740655" y="392575"/>
+            <a:ext cx="6229128" cy="766200"/>
+          </a:xfrm>
+          <a:prstGeom prst="rect">
+            <a:avLst/>
+          </a:prstGeom>
+        </p:spPr>
+        <p:txBody>
+          <a:bodyPr wrap="square" lIns="91425" tIns="91425" rIns="91425" bIns="91425" anchor="ctr" anchorCtr="0">
+            <a:noAutofit/>
+          </a:bodyPr>
+          <a:lstStyle/>
+          <a:p>
+            <a:pPr lvl="0" rtl="0">
+              <a:spcBef>
+                <a:spcPts val="0"/>
+              </a:spcBef>
+              <a:buNone/>
+            </a:pPr>
+            <a:r>
+              <a:rPr lang="en-US" dirty="0" smtClean="0"/>
+              <a:t>Protocol-Oriented Programming in Swift</a:t>
+            </a:r>
+            <a:endParaRPr lang="en" dirty="0"/>
+          </a:p>
+        </p:txBody>
+      </p:sp>
+      <p:sp>
+        <p:nvSpPr>
+          <p:cNvPr id="192" name="Shape 192"/>
+          <p:cNvSpPr txBox="1">
+            <a:spLocks noGrp="1"/>
+          </p:cNvSpPr>
+          <p:nvPr>
+            <p:ph type="sldNum" idx="12"/>
+          </p:nvPr>
+        </p:nvSpPr>
+        <p:spPr>
+          <a:xfrm>
+            <a:off x="7618000" y="4636500"/>
+            <a:ext cx="1487400" cy="315600"/>
+          </a:xfrm>
+          <a:prstGeom prst="rect">
+            <a:avLst/>
+          </a:prstGeom>
+        </p:spPr>
+        <p:txBody>
+          <a:bodyPr wrap="square" lIns="91425" tIns="91425" rIns="91425" bIns="91425" anchor="ctr" anchorCtr="0">
+            <a:noAutofit/>
+          </a:bodyPr>
+          <a:lstStyle/>
+          <a:p>
+            <a:pPr lvl="0">
+              <a:spcBef>
+                <a:spcPts val="0"/>
+              </a:spcBef>
+              <a:buNone/>
+            </a:pPr>
+            <a:fld id="{00000000-1234-1234-1234-123412341234}" type="slidenum">
+              <a:rPr lang="en"/>
+              <a:t>4</a:t>
+            </a:fld>
+            <a:endParaRPr lang="en"/>
+          </a:p>
+        </p:txBody>
+      </p:sp>
+      <p:pic>
+        <p:nvPicPr>
+          <p:cNvPr id="2" name="Picture 1" descr="Rx_Logo_M.png"/>
+          <p:cNvPicPr>
+            <a:picLocks noChangeAspect="1"/>
+          </p:cNvPicPr>
+          <p:nvPr/>
+        </p:nvPicPr>
+        <p:blipFill>
+          <a:blip r:embed="rId3">
+            <a:extLst>
+              <a:ext uri="{28A0092B-C50C-407E-A947-70E740481C1C}">
+                <a14:useLocalDpi xmlns:a14="http://schemas.microsoft.com/office/drawing/2010/main" val="0"/>
+              </a:ext>
+            </a:extLst>
+          </a:blip>
+          <a:stretch>
+            <a:fillRect/>
+          </a:stretch>
+        </p:blipFill>
+        <p:spPr>
+          <a:xfrm>
+            <a:off x="151129" y="442005"/>
+            <a:ext cx="663146" cy="663146"/>
+          </a:xfrm>
+          <a:prstGeom prst="rect">
+            <a:avLst/>
+          </a:prstGeom>
+        </p:spPr>
+      </p:pic>
+      <p:sp>
+        <p:nvSpPr>
           <p:cNvPr id="3" name="TextBox 2"/>
           <p:cNvSpPr txBox="1"/>
           <p:nvPr/>
@@ -5313,7 +6634,7 @@
 </p:sld>
 </file>
 
-<file path=ppt/slides/slide3.xml><?xml version="1.0" encoding="utf-8"?>
+<file path=ppt/slides/slide5.xml><?xml version="1.0" encoding="utf-8"?>
 <p:sld xmlns:a="http://schemas.openxmlformats.org/drawingml/2006/main" xmlns:r="http://schemas.openxmlformats.org/officeDocument/2006/relationships" xmlns:p="http://schemas.openxmlformats.org/presentationml/2006/main">
   <p:cSld>
     <p:spTree>
@@ -5440,7 +6761,7 @@
             </a:pPr>
             <a:fld id="{00000000-1234-1234-1234-123412341234}" type="slidenum">
               <a:rPr lang="en"/>
-              <a:t>3</a:t>
+              <a:t>5</a:t>
             </a:fld>
             <a:endParaRPr lang="en"/>
           </a:p>
@@ -5480,340 +6801,6 @@
     <p:extLst>
       <p:ext uri="{BB962C8B-B14F-4D97-AF65-F5344CB8AC3E}">
         <p14:creationId xmlns:p14="http://schemas.microsoft.com/office/powerpoint/2010/main" val="1800109826"/>
-      </p:ext>
-    </p:extLst>
-  </p:cSld>
-  <p:clrMapOvr>
-    <a:masterClrMapping/>
-  </p:clrMapOvr>
-  <p:timing>
-    <p:tnLst>
-      <p:par>
-        <p:cTn xmlns:p14="http://schemas.microsoft.com/office/powerpoint/2010/main" id="1" dur="indefinite" restart="never" nodeType="tmRoot"/>
-      </p:par>
-    </p:tnLst>
-  </p:timing>
-</p:sld>
-</file>
-
-<file path=ppt/slides/slide4.xml><?xml version="1.0" encoding="utf-8"?>
-<p:sld xmlns:a="http://schemas.openxmlformats.org/drawingml/2006/main" xmlns:r="http://schemas.openxmlformats.org/officeDocument/2006/relationships" xmlns:p="http://schemas.openxmlformats.org/presentationml/2006/main">
-  <p:cSld>
-    <p:spTree>
-      <p:nvGrpSpPr>
-        <p:cNvPr id="1" name="Shape 188"/>
-        <p:cNvGrpSpPr/>
-        <p:nvPr/>
-      </p:nvGrpSpPr>
-      <p:grpSpPr>
-        <a:xfrm>
-          <a:off x="0" y="0"/>
-          <a:ext cx="0" cy="0"/>
-          <a:chOff x="0" y="0"/>
-          <a:chExt cx="0" cy="0"/>
-        </a:xfrm>
-      </p:grpSpPr>
-      <p:sp>
-        <p:nvSpPr>
-          <p:cNvPr id="192" name="Shape 192"/>
-          <p:cNvSpPr txBox="1">
-            <a:spLocks noGrp="1"/>
-          </p:cNvSpPr>
-          <p:nvPr>
-            <p:ph type="sldNum" idx="12"/>
-          </p:nvPr>
-        </p:nvSpPr>
-        <p:spPr>
-          <a:xfrm>
-            <a:off x="7618000" y="4636500"/>
-            <a:ext cx="1487400" cy="315600"/>
-          </a:xfrm>
-          <a:prstGeom prst="rect">
-            <a:avLst/>
-          </a:prstGeom>
-        </p:spPr>
-        <p:txBody>
-          <a:bodyPr wrap="square" lIns="91425" tIns="91425" rIns="91425" bIns="91425" anchor="ctr" anchorCtr="0">
-            <a:noAutofit/>
-          </a:bodyPr>
-          <a:lstStyle/>
-          <a:p>
-            <a:pPr lvl="0">
-              <a:spcBef>
-                <a:spcPts val="0"/>
-              </a:spcBef>
-              <a:buNone/>
-            </a:pPr>
-            <a:fld id="{00000000-1234-1234-1234-123412341234}" type="slidenum">
-              <a:rPr lang="en"/>
-              <a:t>4</a:t>
-            </a:fld>
-            <a:endParaRPr lang="en"/>
-          </a:p>
-        </p:txBody>
-      </p:sp>
-      <p:pic>
-        <p:nvPicPr>
-          <p:cNvPr id="2" name="Picture 1" descr="Rx_Logo_M.png"/>
-          <p:cNvPicPr>
-            <a:picLocks noChangeAspect="1"/>
-          </p:cNvPicPr>
-          <p:nvPr/>
-        </p:nvPicPr>
-        <p:blipFill>
-          <a:blip r:embed="rId3">
-            <a:extLst>
-              <a:ext uri="{28A0092B-C50C-407E-A947-70E740481C1C}">
-                <a14:useLocalDpi xmlns:a14="http://schemas.microsoft.com/office/drawing/2010/main" val="0"/>
-              </a:ext>
-            </a:extLst>
-          </a:blip>
-          <a:stretch>
-            <a:fillRect/>
-          </a:stretch>
-        </p:blipFill>
-        <p:spPr>
-          <a:xfrm>
-            <a:off x="151129" y="442005"/>
-            <a:ext cx="663146" cy="663146"/>
-          </a:xfrm>
-          <a:prstGeom prst="rect">
-            <a:avLst/>
-          </a:prstGeom>
-        </p:spPr>
-      </p:pic>
-      <p:pic>
-        <p:nvPicPr>
-          <p:cNvPr id="3" name="Picture 2" descr="Screen Shot 2018-05-20 at 6.02.54 PM.png"/>
-          <p:cNvPicPr>
-            <a:picLocks noChangeAspect="1"/>
-          </p:cNvPicPr>
-          <p:nvPr/>
-        </p:nvPicPr>
-        <p:blipFill>
-          <a:blip r:embed="rId4">
-            <a:extLst>
-              <a:ext uri="{28A0092B-C50C-407E-A947-70E740481C1C}">
-                <a14:useLocalDpi xmlns:a14="http://schemas.microsoft.com/office/drawing/2010/main" val="0"/>
-              </a:ext>
-            </a:extLst>
-          </a:blip>
-          <a:stretch>
-            <a:fillRect/>
-          </a:stretch>
-        </p:blipFill>
-        <p:spPr>
-          <a:xfrm>
-            <a:off x="0" y="1313275"/>
-            <a:ext cx="9144000" cy="3155894"/>
-          </a:xfrm>
-          <a:prstGeom prst="rect">
-            <a:avLst/>
-          </a:prstGeom>
-        </p:spPr>
-      </p:pic>
-      <p:sp>
-        <p:nvSpPr>
-          <p:cNvPr id="5" name="Title 4"/>
-          <p:cNvSpPr>
-            <a:spLocks noGrp="1"/>
-          </p:cNvSpPr>
-          <p:nvPr>
-            <p:ph type="title"/>
-          </p:nvPr>
-        </p:nvSpPr>
-        <p:spPr/>
-        <p:txBody>
-          <a:bodyPr/>
-          <a:lstStyle/>
-          <a:p>
-            <a:r>
-              <a:rPr lang="en-US" dirty="0" smtClean="0"/>
-              <a:t>Protocol </a:t>
-            </a:r>
-            <a:r>
-              <a:rPr lang="mr-IN" dirty="0" smtClean="0"/>
-              <a:t>–</a:t>
-            </a:r>
-            <a:r>
-              <a:rPr lang="en-US" dirty="0" smtClean="0"/>
-              <a:t> Example 2</a:t>
-            </a:r>
-            <a:endParaRPr lang="en-US" dirty="0"/>
-          </a:p>
-        </p:txBody>
-      </p:sp>
-    </p:spTree>
-    <p:extLst>
-      <p:ext uri="{BB962C8B-B14F-4D97-AF65-F5344CB8AC3E}">
-        <p14:creationId xmlns:p14="http://schemas.microsoft.com/office/powerpoint/2010/main" val="554180485"/>
-      </p:ext>
-    </p:extLst>
-  </p:cSld>
-  <p:clrMapOvr>
-    <a:masterClrMapping/>
-  </p:clrMapOvr>
-  <p:timing>
-    <p:tnLst>
-      <p:par>
-        <p:cTn xmlns:p14="http://schemas.microsoft.com/office/powerpoint/2010/main" id="1" dur="indefinite" restart="never" nodeType="tmRoot"/>
-      </p:par>
-    </p:tnLst>
-  </p:timing>
-</p:sld>
-</file>
-
-<file path=ppt/slides/slide5.xml><?xml version="1.0" encoding="utf-8"?>
-<p:sld xmlns:a="http://schemas.openxmlformats.org/drawingml/2006/main" xmlns:r="http://schemas.openxmlformats.org/officeDocument/2006/relationships" xmlns:p="http://schemas.openxmlformats.org/presentationml/2006/main">
-  <p:cSld>
-    <p:spTree>
-      <p:nvGrpSpPr>
-        <p:cNvPr id="1" name="Shape 188"/>
-        <p:cNvGrpSpPr/>
-        <p:nvPr/>
-      </p:nvGrpSpPr>
-      <p:grpSpPr>
-        <a:xfrm>
-          <a:off x="0" y="0"/>
-          <a:ext cx="0" cy="0"/>
-          <a:chOff x="0" y="0"/>
-          <a:chExt cx="0" cy="0"/>
-        </a:xfrm>
-      </p:grpSpPr>
-      <p:sp>
-        <p:nvSpPr>
-          <p:cNvPr id="192" name="Shape 192"/>
-          <p:cNvSpPr txBox="1">
-            <a:spLocks noGrp="1"/>
-          </p:cNvSpPr>
-          <p:nvPr>
-            <p:ph type="sldNum" idx="12"/>
-          </p:nvPr>
-        </p:nvSpPr>
-        <p:spPr>
-          <a:xfrm>
-            <a:off x="7618000" y="4636500"/>
-            <a:ext cx="1487400" cy="315600"/>
-          </a:xfrm>
-          <a:prstGeom prst="rect">
-            <a:avLst/>
-          </a:prstGeom>
-        </p:spPr>
-        <p:txBody>
-          <a:bodyPr wrap="square" lIns="91425" tIns="91425" rIns="91425" bIns="91425" anchor="ctr" anchorCtr="0">
-            <a:noAutofit/>
-          </a:bodyPr>
-          <a:lstStyle/>
-          <a:p>
-            <a:pPr lvl="0">
-              <a:spcBef>
-                <a:spcPts val="0"/>
-              </a:spcBef>
-              <a:buNone/>
-            </a:pPr>
-            <a:fld id="{00000000-1234-1234-1234-123412341234}" type="slidenum">
-              <a:rPr lang="en"/>
-              <a:t>5</a:t>
-            </a:fld>
-            <a:endParaRPr lang="en"/>
-          </a:p>
-        </p:txBody>
-      </p:sp>
-      <p:pic>
-        <p:nvPicPr>
-          <p:cNvPr id="2" name="Picture 1" descr="Rx_Logo_M.png"/>
-          <p:cNvPicPr>
-            <a:picLocks noChangeAspect="1"/>
-          </p:cNvPicPr>
-          <p:nvPr/>
-        </p:nvPicPr>
-        <p:blipFill>
-          <a:blip r:embed="rId3">
-            <a:extLst>
-              <a:ext uri="{28A0092B-C50C-407E-A947-70E740481C1C}">
-                <a14:useLocalDpi xmlns:a14="http://schemas.microsoft.com/office/drawing/2010/main" val="0"/>
-              </a:ext>
-            </a:extLst>
-          </a:blip>
-          <a:stretch>
-            <a:fillRect/>
-          </a:stretch>
-        </p:blipFill>
-        <p:spPr>
-          <a:xfrm>
-            <a:off x="151129" y="442005"/>
-            <a:ext cx="663146" cy="663146"/>
-          </a:xfrm>
-          <a:prstGeom prst="rect">
-            <a:avLst/>
-          </a:prstGeom>
-        </p:spPr>
-      </p:pic>
-      <p:sp>
-        <p:nvSpPr>
-          <p:cNvPr id="5" name="Title 4"/>
-          <p:cNvSpPr>
-            <a:spLocks noGrp="1"/>
-          </p:cNvSpPr>
-          <p:nvPr>
-            <p:ph type="title"/>
-          </p:nvPr>
-        </p:nvSpPr>
-        <p:spPr/>
-        <p:txBody>
-          <a:bodyPr/>
-          <a:lstStyle/>
-          <a:p>
-            <a:r>
-              <a:rPr lang="en-US" dirty="0" smtClean="0"/>
-              <a:t>Protocol </a:t>
-            </a:r>
-            <a:r>
-              <a:rPr lang="mr-IN" dirty="0" smtClean="0"/>
-              <a:t>–</a:t>
-            </a:r>
-            <a:r>
-              <a:rPr lang="en-US" dirty="0" smtClean="0"/>
-              <a:t> Example 3</a:t>
-            </a:r>
-            <a:endParaRPr lang="en-US" dirty="0"/>
-          </a:p>
-        </p:txBody>
-      </p:sp>
-      <p:pic>
-        <p:nvPicPr>
-          <p:cNvPr id="6" name="Picture 5" descr="Screen Shot 2018-05-20 at 6.10.05 PM.png"/>
-          <p:cNvPicPr>
-            <a:picLocks noChangeAspect="1"/>
-          </p:cNvPicPr>
-          <p:nvPr/>
-        </p:nvPicPr>
-        <p:blipFill>
-          <a:blip r:embed="rId4">
-            <a:extLst>
-              <a:ext uri="{28A0092B-C50C-407E-A947-70E740481C1C}">
-                <a14:useLocalDpi xmlns:a14="http://schemas.microsoft.com/office/drawing/2010/main" val="0"/>
-              </a:ext>
-            </a:extLst>
-          </a:blip>
-          <a:stretch>
-            <a:fillRect/>
-          </a:stretch>
-        </p:blipFill>
-        <p:spPr>
-          <a:xfrm>
-            <a:off x="725495" y="1324534"/>
-            <a:ext cx="6066100" cy="3818965"/>
-          </a:xfrm>
-          <a:prstGeom prst="rect">
-            <a:avLst/>
-          </a:prstGeom>
-        </p:spPr>
-      </p:pic>
-    </p:spTree>
-    <p:extLst>
-      <p:ext uri="{BB962C8B-B14F-4D97-AF65-F5344CB8AC3E}">
-        <p14:creationId xmlns:p14="http://schemas.microsoft.com/office/powerpoint/2010/main" val="2084728613"/>
       </p:ext>
     </p:extLst>
   </p:cSld>
@@ -5849,53 +6836,6 @@
       </p:grpSpPr>
       <p:sp>
         <p:nvSpPr>
-          <p:cNvPr id="189" name="Shape 189"/>
-          <p:cNvSpPr txBox="1">
-            <a:spLocks noGrp="1"/>
-          </p:cNvSpPr>
-          <p:nvPr>
-            <p:ph type="title"/>
-          </p:nvPr>
-        </p:nvSpPr>
-        <p:spPr>
-          <a:xfrm>
-            <a:off x="740655" y="392575"/>
-            <a:ext cx="6229128" cy="766200"/>
-          </a:xfrm>
-          <a:prstGeom prst="rect">
-            <a:avLst/>
-          </a:prstGeom>
-        </p:spPr>
-        <p:txBody>
-          <a:bodyPr wrap="square" lIns="91425" tIns="91425" rIns="91425" bIns="91425" anchor="ctr" anchorCtr="0">
-            <a:noAutofit/>
-          </a:bodyPr>
-          <a:lstStyle/>
-          <a:p>
-            <a:pPr lvl="0" rtl="0">
-              <a:spcBef>
-                <a:spcPts val="0"/>
-              </a:spcBef>
-              <a:buNone/>
-            </a:pPr>
-            <a:r>
-              <a:rPr lang="en-US" dirty="0" smtClean="0"/>
-              <a:t>Grouping </a:t>
-            </a:r>
-            <a:r>
-              <a:rPr lang="mr-IN" dirty="0" smtClean="0"/>
-              <a:t>–</a:t>
-            </a:r>
-            <a:r>
-              <a:rPr lang="en-US" dirty="0" smtClean="0"/>
-              <a:t> Protocol Extension, associatetype</a:t>
-            </a:r>
-            <a:endParaRPr lang="en" dirty="0"/>
-          </a:p>
-        </p:txBody>
-      </p:sp>
-      <p:sp>
-        <p:nvSpPr>
           <p:cNvPr id="192" name="Shape 192"/>
           <p:cNvSpPr txBox="1">
             <a:spLocks noGrp="1"/>
@@ -5965,7 +6905,7 @@
       </p:pic>
       <p:pic>
         <p:nvPicPr>
-          <p:cNvPr id="4" name="Picture 3" descr="Screen Shot 2018-05-06 at 7.07.45 PM.png"/>
+          <p:cNvPr id="3" name="Picture 2" descr="Screen Shot 2018-05-20 at 6.02.54 PM.png"/>
           <p:cNvPicPr>
             <a:picLocks noChangeAspect="1"/>
           </p:cNvPicPr>
@@ -5985,18 +6925,49 @@
         </p:blipFill>
         <p:spPr>
           <a:xfrm>
-            <a:off x="740655" y="1920535"/>
-            <a:ext cx="5054600" cy="1435100"/>
+            <a:off x="0" y="1313275"/>
+            <a:ext cx="9144000" cy="3155894"/>
           </a:xfrm>
           <a:prstGeom prst="rect">
             <a:avLst/>
           </a:prstGeom>
         </p:spPr>
       </p:pic>
+      <p:sp>
+        <p:nvSpPr>
+          <p:cNvPr id="5" name="Title 4"/>
+          <p:cNvSpPr>
+            <a:spLocks noGrp="1"/>
+          </p:cNvSpPr>
+          <p:nvPr>
+            <p:ph type="title"/>
+          </p:nvPr>
+        </p:nvSpPr>
+        <p:spPr/>
+        <p:txBody>
+          <a:bodyPr/>
+          <a:lstStyle/>
+          <a:p>
+            <a:r>
+              <a:rPr lang="en-US" dirty="0" smtClean="0"/>
+              <a:t>Protocol </a:t>
+            </a:r>
+            <a:r>
+              <a:rPr lang="mr-IN" dirty="0" smtClean="0"/>
+              <a:t>–</a:t>
+            </a:r>
+            <a:r>
+              <a:rPr lang="en-US" dirty="0" smtClean="0"/>
+              <a:t> Example 2</a:t>
+            </a:r>
+            <a:endParaRPr lang="en-US" dirty="0"/>
+          </a:p>
+        </p:txBody>
+      </p:sp>
     </p:spTree>
     <p:extLst>
       <p:ext uri="{BB962C8B-B14F-4D97-AF65-F5344CB8AC3E}">
-        <p14:creationId xmlns:p14="http://schemas.microsoft.com/office/powerpoint/2010/main" val="201497647"/>
+        <p14:creationId xmlns:p14="http://schemas.microsoft.com/office/powerpoint/2010/main" val="554180485"/>
       </p:ext>
     </p:extLst>
   </p:cSld>
@@ -6032,53 +7003,6 @@
       </p:grpSpPr>
       <p:sp>
         <p:nvSpPr>
-          <p:cNvPr id="189" name="Shape 189"/>
-          <p:cNvSpPr txBox="1">
-            <a:spLocks noGrp="1"/>
-          </p:cNvSpPr>
-          <p:nvPr>
-            <p:ph type="title"/>
-          </p:nvPr>
-        </p:nvSpPr>
-        <p:spPr>
-          <a:xfrm>
-            <a:off x="740655" y="392575"/>
-            <a:ext cx="6229128" cy="766200"/>
-          </a:xfrm>
-          <a:prstGeom prst="rect">
-            <a:avLst/>
-          </a:prstGeom>
-        </p:spPr>
-        <p:txBody>
-          <a:bodyPr wrap="square" lIns="91425" tIns="91425" rIns="91425" bIns="91425" anchor="ctr" anchorCtr="0">
-            <a:noAutofit/>
-          </a:bodyPr>
-          <a:lstStyle/>
-          <a:p>
-            <a:pPr lvl="0" rtl="0">
-              <a:spcBef>
-                <a:spcPts val="0"/>
-              </a:spcBef>
-              <a:buNone/>
-            </a:pPr>
-            <a:r>
-              <a:rPr lang="en-US" dirty="0" smtClean="0"/>
-              <a:t>Grouping </a:t>
-            </a:r>
-            <a:r>
-              <a:rPr lang="mr-IN" dirty="0" smtClean="0"/>
-              <a:t>–</a:t>
-            </a:r>
-            <a:r>
-              <a:rPr lang="en-US" dirty="0" smtClean="0"/>
-              <a:t> Protocol Extension, associatetype</a:t>
-            </a:r>
-            <a:endParaRPr lang="en" dirty="0"/>
-          </a:p>
-        </p:txBody>
-      </p:sp>
-      <p:sp>
-        <p:nvSpPr>
           <p:cNvPr id="192" name="Shape 192"/>
           <p:cNvSpPr txBox="1">
             <a:spLocks noGrp="1"/>
@@ -6146,9 +7070,40 @@
           </a:prstGeom>
         </p:spPr>
       </p:pic>
+      <p:sp>
+        <p:nvSpPr>
+          <p:cNvPr id="5" name="Title 4"/>
+          <p:cNvSpPr>
+            <a:spLocks noGrp="1"/>
+          </p:cNvSpPr>
+          <p:nvPr>
+            <p:ph type="title"/>
+          </p:nvPr>
+        </p:nvSpPr>
+        <p:spPr/>
+        <p:txBody>
+          <a:bodyPr/>
+          <a:lstStyle/>
+          <a:p>
+            <a:r>
+              <a:rPr lang="en-US" dirty="0" smtClean="0"/>
+              <a:t>Protocol </a:t>
+            </a:r>
+            <a:r>
+              <a:rPr lang="mr-IN" dirty="0" smtClean="0"/>
+              <a:t>–</a:t>
+            </a:r>
+            <a:r>
+              <a:rPr lang="en-US" dirty="0" smtClean="0"/>
+              <a:t> Example 3</a:t>
+            </a:r>
+            <a:endParaRPr lang="en-US" dirty="0"/>
+          </a:p>
+        </p:txBody>
+      </p:sp>
       <p:pic>
         <p:nvPicPr>
-          <p:cNvPr id="5" name="Picture 4" descr="Screen Shot 2018-05-06 at 5.56.43 PM.png"/>
+          <p:cNvPr id="6" name="Picture 5" descr="Screen Shot 2018-05-20 at 6.10.05 PM.png"/>
           <p:cNvPicPr>
             <a:picLocks noChangeAspect="1"/>
           </p:cNvPicPr>
@@ -6168,68 +7123,8 @@
         </p:blipFill>
         <p:spPr>
           <a:xfrm>
-            <a:off x="54580" y="3754673"/>
-            <a:ext cx="4394200" cy="990600"/>
-          </a:xfrm>
-          <a:prstGeom prst="rect">
-            <a:avLst/>
-          </a:prstGeom>
-        </p:spPr>
-      </p:pic>
-      <p:pic>
-        <p:nvPicPr>
-          <p:cNvPr id="6" name="Picture 5" descr="Screen Shot 2018-05-06 at 5.56.36 PM.png"/>
-          <p:cNvPicPr>
-            <a:picLocks noChangeAspect="1"/>
-          </p:cNvPicPr>
-          <p:nvPr/>
-        </p:nvPicPr>
-        <p:blipFill>
-          <a:blip r:embed="rId5">
-            <a:extLst>
-              <a:ext uri="{28A0092B-C50C-407E-A947-70E740481C1C}">
-                <a14:useLocalDpi xmlns:a14="http://schemas.microsoft.com/office/drawing/2010/main" val="0"/>
-              </a:ext>
-            </a:extLst>
-          </a:blip>
-          <a:stretch>
-            <a:fillRect/>
-          </a:stretch>
-        </p:blipFill>
-        <p:spPr>
-          <a:xfrm>
-            <a:off x="0" y="2875361"/>
-            <a:ext cx="9144000" cy="860907"/>
-          </a:xfrm>
-          <a:prstGeom prst="rect">
-            <a:avLst/>
-          </a:prstGeom>
-        </p:spPr>
-      </p:pic>
-      <p:pic>
-        <p:nvPicPr>
-          <p:cNvPr id="3" name="Picture 2" descr="Screen Shot 2018-05-06 at 7.07.45 PM.png"/>
-          <p:cNvPicPr>
-            <a:picLocks noChangeAspect="1"/>
-          </p:cNvPicPr>
-          <p:nvPr/>
-        </p:nvPicPr>
-        <p:blipFill>
-          <a:blip r:embed="rId6">
-            <a:extLst>
-              <a:ext uri="{28A0092B-C50C-407E-A947-70E740481C1C}">
-                <a14:useLocalDpi xmlns:a14="http://schemas.microsoft.com/office/drawing/2010/main" val="0"/>
-              </a:ext>
-            </a:extLst>
-          </a:blip>
-          <a:stretch>
-            <a:fillRect/>
-          </a:stretch>
-        </p:blipFill>
-        <p:spPr>
-          <a:xfrm>
-            <a:off x="0" y="1349972"/>
-            <a:ext cx="5054600" cy="1435100"/>
+            <a:off x="725495" y="1324534"/>
+            <a:ext cx="6066100" cy="3818965"/>
           </a:xfrm>
           <a:prstGeom prst="rect">
             <a:avLst/>
@@ -6239,7 +7134,7 @@
     </p:spTree>
     <p:extLst>
       <p:ext uri="{BB962C8B-B14F-4D97-AF65-F5344CB8AC3E}">
-        <p14:creationId xmlns:p14="http://schemas.microsoft.com/office/powerpoint/2010/main" val="483918983"/>
+        <p14:creationId xmlns:p14="http://schemas.microsoft.com/office/powerpoint/2010/main" val="2084728613"/>
       </p:ext>
     </p:extLst>
   </p:cSld>
@@ -6391,7 +7286,7 @@
       </p:pic>
       <p:pic>
         <p:nvPicPr>
-          <p:cNvPr id="7" name="Picture 6" descr="Screen Shot 2018-05-06 at 5.56.52 PM.png"/>
+          <p:cNvPr id="4" name="Picture 3" descr="Screen Shot 2018-05-06 at 7.07.45 PM.png"/>
           <p:cNvPicPr>
             <a:picLocks noChangeAspect="1"/>
           </p:cNvPicPr>
@@ -6411,38 +7306,8 @@
         </p:blipFill>
         <p:spPr>
           <a:xfrm>
-            <a:off x="0" y="1493789"/>
-            <a:ext cx="9144000" cy="963416"/>
-          </a:xfrm>
-          <a:prstGeom prst="rect">
-            <a:avLst/>
-          </a:prstGeom>
-        </p:spPr>
-      </p:pic>
-      <p:pic>
-        <p:nvPicPr>
-          <p:cNvPr id="8" name="Picture 7" descr="Screen Shot 2018-05-06 at 5.59.50 PM.png"/>
-          <p:cNvPicPr>
-            <a:picLocks noChangeAspect="1"/>
-          </p:cNvPicPr>
-          <p:nvPr/>
-        </p:nvPicPr>
-        <p:blipFill>
-          <a:blip r:embed="rId5">
-            <a:extLst>
-              <a:ext uri="{28A0092B-C50C-407E-A947-70E740481C1C}">
-                <a14:useLocalDpi xmlns:a14="http://schemas.microsoft.com/office/drawing/2010/main" val="0"/>
-              </a:ext>
-            </a:extLst>
-          </a:blip>
-          <a:stretch>
-            <a:fillRect/>
-          </a:stretch>
-        </p:blipFill>
-        <p:spPr>
-          <a:xfrm>
-            <a:off x="0" y="2506285"/>
-            <a:ext cx="7137400" cy="2184400"/>
+            <a:off x="740655" y="1920535"/>
+            <a:ext cx="5054600" cy="1435100"/>
           </a:xfrm>
           <a:prstGeom prst="rect">
             <a:avLst/>
@@ -6452,7 +7317,7 @@
     </p:spTree>
     <p:extLst>
       <p:ext uri="{BB962C8B-B14F-4D97-AF65-F5344CB8AC3E}">
-        <p14:creationId xmlns:p14="http://schemas.microsoft.com/office/powerpoint/2010/main" val="1851042509"/>
+        <p14:creationId xmlns:p14="http://schemas.microsoft.com/office/powerpoint/2010/main" val="201497647"/>
       </p:ext>
     </p:extLst>
   </p:cSld>
@@ -6604,7 +7469,7 @@
       </p:pic>
       <p:pic>
         <p:nvPicPr>
-          <p:cNvPr id="3" name="Picture 2" descr="Screen Shot 2018-05-06 at 6.04.06 PM.png"/>
+          <p:cNvPr id="5" name="Picture 4" descr="Screen Shot 2018-05-06 at 5.56.43 PM.png"/>
           <p:cNvPicPr>
             <a:picLocks noChangeAspect="1"/>
           </p:cNvPicPr>
@@ -6624,8 +7489,8 @@
         </p:blipFill>
         <p:spPr>
           <a:xfrm>
-            <a:off x="270500" y="1622183"/>
-            <a:ext cx="4953000" cy="1663700"/>
+            <a:off x="54580" y="3754673"/>
+            <a:ext cx="4394200" cy="990600"/>
           </a:xfrm>
           <a:prstGeom prst="rect">
             <a:avLst/>
@@ -6634,7 +7499,7 @@
       </p:pic>
       <p:pic>
         <p:nvPicPr>
-          <p:cNvPr id="4" name="Picture 3" descr="Screen Shot 2018-05-06 at 6.04.50 PM.png"/>
+          <p:cNvPr id="6" name="Picture 5" descr="Screen Shot 2018-05-06 at 5.56.36 PM.png"/>
           <p:cNvPicPr>
             <a:picLocks noChangeAspect="1"/>
           </p:cNvPicPr>
@@ -6654,8 +7519,38 @@
         </p:blipFill>
         <p:spPr>
           <a:xfrm>
-            <a:off x="270500" y="3588711"/>
-            <a:ext cx="2451100" cy="381000"/>
+            <a:off x="0" y="2875361"/>
+            <a:ext cx="9144000" cy="860907"/>
+          </a:xfrm>
+          <a:prstGeom prst="rect">
+            <a:avLst/>
+          </a:prstGeom>
+        </p:spPr>
+      </p:pic>
+      <p:pic>
+        <p:nvPicPr>
+          <p:cNvPr id="3" name="Picture 2" descr="Screen Shot 2018-05-06 at 7.07.45 PM.png"/>
+          <p:cNvPicPr>
+            <a:picLocks noChangeAspect="1"/>
+          </p:cNvPicPr>
+          <p:nvPr/>
+        </p:nvPicPr>
+        <p:blipFill>
+          <a:blip r:embed="rId6">
+            <a:extLst>
+              <a:ext uri="{28A0092B-C50C-407E-A947-70E740481C1C}">
+                <a14:useLocalDpi xmlns:a14="http://schemas.microsoft.com/office/drawing/2010/main" val="0"/>
+              </a:ext>
+            </a:extLst>
+          </a:blip>
+          <a:stretch>
+            <a:fillRect/>
+          </a:stretch>
+        </p:blipFill>
+        <p:spPr>
+          <a:xfrm>
+            <a:off x="0" y="1349972"/>
+            <a:ext cx="5054600" cy="1435100"/>
           </a:xfrm>
           <a:prstGeom prst="rect">
             <a:avLst/>
@@ -6665,7 +7560,7 @@
     </p:spTree>
     <p:extLst>
       <p:ext uri="{BB962C8B-B14F-4D97-AF65-F5344CB8AC3E}">
-        <p14:creationId xmlns:p14="http://schemas.microsoft.com/office/powerpoint/2010/main" val="2555477460"/>
+        <p14:creationId xmlns:p14="http://schemas.microsoft.com/office/powerpoint/2010/main" val="483918983"/>
       </p:ext>
     </p:extLst>
   </p:cSld>

</xml_diff>

<commit_message>
Advanced RxSwift Day 4 Content changed
</commit_message>
<xml_diff>
--- a/AdvancedRxSwift/day1/AdvancedRxSwift1.pptx
+++ b/AdvancedRxSwift/day1/AdvancedRxSwift1.pptx
@@ -7579,26 +7579,40 @@
               <a:t> </a:t>
             </a:r>
             <a:r>
-              <a:rPr lang="en-US" dirty="0" smtClean="0"/>
-              <a:t>Advanced </a:t>
-            </a:r>
-            <a:r>
-              <a:rPr lang="en-US" dirty="0" err="1" smtClean="0"/>
+              <a:rPr lang="en-US" dirty="0"/>
+              <a:t>Adding a Reactive Extension to Custom UI Element, </a:t>
+            </a:r>
+          </a:p>
+          <a:p>
+            <a:r>
+              <a:rPr lang="en-US" dirty="0"/>
+              <a:t>              2 Way Binding, Advanced </a:t>
+            </a:r>
+            <a:r>
+              <a:rPr lang="en-US" dirty="0" err="1"/>
               <a:t>TableView</a:t>
             </a:r>
             <a:r>
-              <a:rPr lang="en-US" dirty="0" smtClean="0"/>
-              <a:t> - </a:t>
-            </a:r>
-            <a:r>
-              <a:rPr lang="en-US" dirty="0" err="1" smtClean="0"/>
+              <a:rPr lang="en-US" dirty="0"/>
+              <a:t> </a:t>
+            </a:r>
+            <a:r>
+              <a:rPr lang="mr-IN" dirty="0"/>
+              <a:t>–</a:t>
+            </a:r>
+            <a:r>
+              <a:rPr lang="en-US" dirty="0"/>
+              <a:t> </a:t>
+            </a:r>
+            <a:r>
+              <a:rPr lang="en-US" dirty="0" err="1"/>
               <a:t>RxDataSources</a:t>
             </a:r>
-            <a:endParaRPr lang="en-US" dirty="0"/>
-          </a:p>
-          <a:p>
-            <a:r>
-              <a:rPr lang="en-US" dirty="0"/>
+            <a:endParaRPr lang="en-US"/>
+          </a:p>
+          <a:p>
+            <a:r>
+              <a:rPr lang="en-US" smtClean="0"/>
               <a:t>Day </a:t>
             </a:r>
             <a:r>

</xml_diff>

<commit_message>
Advanced RxSwift Day3 - add scan operator
</commit_message>
<xml_diff>
--- a/AdvancedRxSwift/day1/AdvancedRxSwift1.pptx
+++ b/AdvancedRxSwift/day1/AdvancedRxSwift1.pptx
@@ -7557,7 +7557,15 @@
             </a:r>
             <a:r>
               <a:rPr lang="en-US" dirty="0" smtClean="0"/>
-              <a:t>Binding Track Activity (show / hide ‘Loading’ )</a:t>
+              <a:t>Binding Track Activity (show / hide ‘Loading</a:t>
+            </a:r>
+            <a:r>
+              <a:rPr lang="en-US" smtClean="0"/>
+              <a:t>’ </a:t>
+            </a:r>
+            <a:r>
+              <a:rPr lang="en-US"/>
+              <a:t>), Scan Operator</a:t>
             </a:r>
             <a:endParaRPr lang="en-US" dirty="0"/>
           </a:p>
@@ -7576,11 +7584,7 @@
             </a:r>
             <a:r>
               <a:rPr lang="en-US" dirty="0"/>
-              <a:t> </a:t>
-            </a:r>
-            <a:r>
-              <a:rPr lang="en-US" dirty="0"/>
-              <a:t>Adding a Reactive Extension to Custom UI Element, </a:t>
+              <a:t> Adding a Reactive Extension to Custom UI Element, </a:t>
             </a:r>
           </a:p>
           <a:p>
@@ -7608,16 +7612,12 @@
               <a:rPr lang="en-US" dirty="0" err="1"/>
               <a:t>RxDataSources</a:t>
             </a:r>
-            <a:endParaRPr lang="en-US"/>
-          </a:p>
-          <a:p>
-            <a:r>
-              <a:rPr lang="en-US" smtClean="0"/>
-              <a:t>Day </a:t>
-            </a:r>
+            <a:endParaRPr lang="en-US" dirty="0"/>
+          </a:p>
+          <a:p>
             <a:r>
               <a:rPr lang="en-US" dirty="0" smtClean="0"/>
-              <a:t>5 </a:t>
+              <a:t>Day 5 </a:t>
             </a:r>
             <a:r>
               <a:rPr lang="mr-IN" dirty="0"/>

</xml_diff>